<commit_message>
signup and login completed
</commit_message>
<xml_diff>
--- a/Architecture.pptx
+++ b/Architecture.pptx
@@ -7,6 +7,8 @@
   <p:sldIdLst>
     <p:sldId id="256" r:id="rId2"/>
     <p:sldId id="257" r:id="rId3"/>
+    <p:sldId id="258" r:id="rId4"/>
+    <p:sldId id="259" r:id="rId5"/>
   </p:sldIdLst>
   <p:sldSz cx="9144000" cy="6858000" type="screen4x3"/>
   <p:notesSz cx="6858000" cy="9144000"/>
@@ -3629,6 +3631,996 @@
 </p:sld>
 </file>
 
+<file path=ppt/slides/slide3.xml><?xml version="1.0" encoding="utf-8"?>
+<p:sld xmlns:a="http://schemas.openxmlformats.org/drawingml/2006/main" xmlns:r="http://schemas.openxmlformats.org/officeDocument/2006/relationships" xmlns:p="http://schemas.openxmlformats.org/presentationml/2006/main">
+  <p:cSld>
+    <p:spTree>
+      <p:nvGrpSpPr>
+        <p:cNvPr id="1" name=""/>
+        <p:cNvGrpSpPr/>
+        <p:nvPr/>
+      </p:nvGrpSpPr>
+      <p:grpSpPr>
+        <a:xfrm>
+          <a:off x="0" y="0"/>
+          <a:ext cx="0" cy="0"/>
+          <a:chOff x="0" y="0"/>
+          <a:chExt cx="0" cy="0"/>
+        </a:xfrm>
+      </p:grpSpPr>
+      <p:pic>
+        <p:nvPicPr>
+          <p:cNvPr id="2050" name="Picture 2"/>
+          <p:cNvPicPr>
+            <a:picLocks noChangeAspect="1" noChangeArrowheads="1"/>
+          </p:cNvPicPr>
+          <p:nvPr/>
+        </p:nvPicPr>
+        <p:blipFill>
+          <a:blip r:embed="rId2">
+            <a:extLst>
+              <a:ext uri="{28A0092B-C50C-407E-A947-70E740481C1C}">
+                <a14:useLocalDpi xmlns:a14="http://schemas.microsoft.com/office/drawing/2010/main" val="0"/>
+              </a:ext>
+            </a:extLst>
+          </a:blip>
+          <a:srcRect/>
+          <a:stretch>
+            <a:fillRect/>
+          </a:stretch>
+        </p:blipFill>
+        <p:spPr bwMode="auto">
+          <a:xfrm>
+            <a:off x="474663" y="228600"/>
+            <a:ext cx="8193087" cy="6248399"/>
+          </a:xfrm>
+          <a:prstGeom prst="rect">
+            <a:avLst/>
+          </a:prstGeom>
+          <a:noFill/>
+          <a:ln>
+            <a:noFill/>
+          </a:ln>
+          <a:effectLst/>
+          <a:extLst>
+            <a:ext uri="{909E8E84-426E-40DD-AFC4-6F175D3DCCD1}">
+              <a14:hiddenFill xmlns:a14="http://schemas.microsoft.com/office/drawing/2010/main">
+                <a:solidFill>
+                  <a:schemeClr val="accent1"/>
+                </a:solidFill>
+              </a14:hiddenFill>
+            </a:ext>
+            <a:ext uri="{91240B29-F687-4F45-9708-019B960494DF}">
+              <a14:hiddenLine xmlns:a14="http://schemas.microsoft.com/office/drawing/2010/main" w="9525">
+                <a:solidFill>
+                  <a:schemeClr val="tx1"/>
+                </a:solidFill>
+                <a:miter lim="800000"/>
+                <a:headEnd/>
+                <a:tailEnd/>
+              </a14:hiddenLine>
+            </a:ext>
+            <a:ext uri="{AF507438-7753-43E0-B8FC-AC1667EBCBE1}">
+              <a14:hiddenEffects xmlns:a14="http://schemas.microsoft.com/office/drawing/2010/main">
+                <a:effectLst>
+                  <a:outerShdw dist="35921" dir="2700000" algn="ctr" rotWithShape="0">
+                    <a:schemeClr val="bg2"/>
+                  </a:outerShdw>
+                </a:effectLst>
+              </a14:hiddenEffects>
+            </a:ext>
+          </a:extLst>
+        </p:spPr>
+      </p:pic>
+      <p:cxnSp>
+        <p:nvCxnSpPr>
+          <p:cNvPr id="5" name="Straight Arrow Connector 4"/>
+          <p:cNvCxnSpPr/>
+          <p:nvPr/>
+        </p:nvCxnSpPr>
+        <p:spPr>
+          <a:xfrm>
+            <a:off x="2819400" y="1828800"/>
+            <a:ext cx="1751806" cy="1828800"/>
+          </a:xfrm>
+          <a:prstGeom prst="straightConnector1">
+            <a:avLst/>
+          </a:prstGeom>
+          <a:ln>
+            <a:tailEnd type="arrow"/>
+          </a:ln>
+        </p:spPr>
+        <p:style>
+          <a:lnRef idx="1">
+            <a:schemeClr val="accent1"/>
+          </a:lnRef>
+          <a:fillRef idx="0">
+            <a:schemeClr val="accent1"/>
+          </a:fillRef>
+          <a:effectRef idx="0">
+            <a:schemeClr val="accent1"/>
+          </a:effectRef>
+          <a:fontRef idx="minor">
+            <a:schemeClr val="tx1"/>
+          </a:fontRef>
+        </p:style>
+      </p:cxnSp>
+      <p:cxnSp>
+        <p:nvCxnSpPr>
+          <p:cNvPr id="8" name="Straight Arrow Connector 7"/>
+          <p:cNvCxnSpPr/>
+          <p:nvPr/>
+        </p:nvCxnSpPr>
+        <p:spPr>
+          <a:xfrm flipV="1">
+            <a:off x="4800600" y="2286001"/>
+            <a:ext cx="1752600" cy="1447799"/>
+          </a:xfrm>
+          <a:prstGeom prst="straightConnector1">
+            <a:avLst/>
+          </a:prstGeom>
+          <a:ln>
+            <a:tailEnd type="arrow"/>
+          </a:ln>
+        </p:spPr>
+        <p:style>
+          <a:lnRef idx="1">
+            <a:schemeClr val="accent1"/>
+          </a:lnRef>
+          <a:fillRef idx="0">
+            <a:schemeClr val="accent1"/>
+          </a:fillRef>
+          <a:effectRef idx="0">
+            <a:schemeClr val="accent1"/>
+          </a:effectRef>
+          <a:fontRef idx="minor">
+            <a:schemeClr val="tx1"/>
+          </a:fontRef>
+        </p:style>
+      </p:cxnSp>
+      <p:cxnSp>
+        <p:nvCxnSpPr>
+          <p:cNvPr id="12" name="Straight Arrow Connector 11"/>
+          <p:cNvCxnSpPr/>
+          <p:nvPr/>
+        </p:nvCxnSpPr>
+        <p:spPr>
+          <a:xfrm flipH="1" flipV="1">
+            <a:off x="2438400" y="2514600"/>
+            <a:ext cx="1143000" cy="1219200"/>
+          </a:xfrm>
+          <a:prstGeom prst="straightConnector1">
+            <a:avLst/>
+          </a:prstGeom>
+          <a:ln>
+            <a:tailEnd type="arrow"/>
+          </a:ln>
+        </p:spPr>
+        <p:style>
+          <a:lnRef idx="1">
+            <a:schemeClr val="accent1"/>
+          </a:lnRef>
+          <a:fillRef idx="0">
+            <a:schemeClr val="accent1"/>
+          </a:fillRef>
+          <a:effectRef idx="0">
+            <a:schemeClr val="accent1"/>
+          </a:effectRef>
+          <a:fontRef idx="minor">
+            <a:schemeClr val="tx1"/>
+          </a:fontRef>
+        </p:style>
+      </p:cxnSp>
+      <p:cxnSp>
+        <p:nvCxnSpPr>
+          <p:cNvPr id="16" name="Straight Arrow Connector 15"/>
+          <p:cNvCxnSpPr/>
+          <p:nvPr/>
+        </p:nvCxnSpPr>
+        <p:spPr>
+          <a:xfrm>
+            <a:off x="1295400" y="2590800"/>
+            <a:ext cx="1751806" cy="1447800"/>
+          </a:xfrm>
+          <a:prstGeom prst="straightConnector1">
+            <a:avLst/>
+          </a:prstGeom>
+          <a:ln>
+            <a:tailEnd type="arrow"/>
+          </a:ln>
+        </p:spPr>
+        <p:style>
+          <a:lnRef idx="1">
+            <a:schemeClr val="accent1"/>
+          </a:lnRef>
+          <a:fillRef idx="0">
+            <a:schemeClr val="accent1"/>
+          </a:fillRef>
+          <a:effectRef idx="0">
+            <a:schemeClr val="accent1"/>
+          </a:effectRef>
+          <a:fontRef idx="minor">
+            <a:schemeClr val="tx1"/>
+          </a:fontRef>
+        </p:style>
+      </p:cxnSp>
+      <p:cxnSp>
+        <p:nvCxnSpPr>
+          <p:cNvPr id="18" name="Straight Arrow Connector 17"/>
+          <p:cNvCxnSpPr/>
+          <p:nvPr/>
+        </p:nvCxnSpPr>
+        <p:spPr>
+          <a:xfrm flipV="1">
+            <a:off x="4800600" y="2362200"/>
+            <a:ext cx="2514600" cy="1524000"/>
+          </a:xfrm>
+          <a:prstGeom prst="straightConnector1">
+            <a:avLst/>
+          </a:prstGeom>
+          <a:ln>
+            <a:tailEnd type="arrow"/>
+          </a:ln>
+        </p:spPr>
+        <p:style>
+          <a:lnRef idx="1">
+            <a:schemeClr val="accent1"/>
+          </a:lnRef>
+          <a:fillRef idx="0">
+            <a:schemeClr val="accent1"/>
+          </a:fillRef>
+          <a:effectRef idx="0">
+            <a:schemeClr val="accent1"/>
+          </a:effectRef>
+          <a:fontRef idx="minor">
+            <a:schemeClr val="tx1"/>
+          </a:fontRef>
+        </p:style>
+      </p:cxnSp>
+      <p:cxnSp>
+        <p:nvCxnSpPr>
+          <p:cNvPr id="21" name="Straight Arrow Connector 20"/>
+          <p:cNvCxnSpPr/>
+          <p:nvPr/>
+        </p:nvCxnSpPr>
+        <p:spPr>
+          <a:xfrm flipH="1">
+            <a:off x="4114800" y="2286001"/>
+            <a:ext cx="3848497" cy="3200399"/>
+          </a:xfrm>
+          <a:prstGeom prst="straightConnector1">
+            <a:avLst/>
+          </a:prstGeom>
+          <a:ln>
+            <a:tailEnd type="arrow"/>
+          </a:ln>
+        </p:spPr>
+        <p:style>
+          <a:lnRef idx="1">
+            <a:schemeClr val="accent1"/>
+          </a:lnRef>
+          <a:fillRef idx="0">
+            <a:schemeClr val="accent1"/>
+          </a:fillRef>
+          <a:effectRef idx="0">
+            <a:schemeClr val="accent1"/>
+          </a:effectRef>
+          <a:fontRef idx="minor">
+            <a:schemeClr val="tx1"/>
+          </a:fontRef>
+        </p:style>
+      </p:cxnSp>
+      <p:sp>
+        <p:nvSpPr>
+          <p:cNvPr id="23" name="TextBox 22"/>
+          <p:cNvSpPr txBox="1"/>
+          <p:nvPr/>
+        </p:nvSpPr>
+        <p:spPr>
+          <a:xfrm>
+            <a:off x="3505200" y="2373868"/>
+            <a:ext cx="301686" cy="369332"/>
+          </a:xfrm>
+          <a:prstGeom prst="rect">
+            <a:avLst/>
+          </a:prstGeom>
+          <a:noFill/>
+        </p:spPr>
+        <p:txBody>
+          <a:bodyPr wrap="none" rtlCol="0">
+            <a:spAutoFit/>
+          </a:bodyPr>
+          <a:lstStyle/>
+          <a:p>
+            <a:r>
+              <a:rPr lang="en-IN" dirty="0">
+                <a:solidFill>
+                  <a:srgbClr val="FF0000"/>
+                </a:solidFill>
+              </a:rPr>
+              <a:t>1</a:t>
+            </a:r>
+          </a:p>
+        </p:txBody>
+      </p:sp>
+      <p:sp>
+        <p:nvSpPr>
+          <p:cNvPr id="25" name="TextBox 24"/>
+          <p:cNvSpPr txBox="1"/>
+          <p:nvPr/>
+        </p:nvSpPr>
+        <p:spPr>
+          <a:xfrm>
+            <a:off x="5641914" y="2526268"/>
+            <a:ext cx="301686" cy="369332"/>
+          </a:xfrm>
+          <a:prstGeom prst="rect">
+            <a:avLst/>
+          </a:prstGeom>
+          <a:noFill/>
+        </p:spPr>
+        <p:txBody>
+          <a:bodyPr wrap="none" rtlCol="0">
+            <a:spAutoFit/>
+          </a:bodyPr>
+          <a:lstStyle/>
+          <a:p>
+            <a:r>
+              <a:rPr lang="en-IN" dirty="0" smtClean="0">
+                <a:solidFill>
+                  <a:srgbClr val="FF0000"/>
+                </a:solidFill>
+              </a:rPr>
+              <a:t>2</a:t>
+            </a:r>
+            <a:endParaRPr lang="en-IN" dirty="0">
+              <a:solidFill>
+                <a:srgbClr val="FF0000"/>
+              </a:solidFill>
+            </a:endParaRPr>
+          </a:p>
+        </p:txBody>
+      </p:sp>
+      <p:sp>
+        <p:nvSpPr>
+          <p:cNvPr id="26" name="TextBox 25"/>
+          <p:cNvSpPr txBox="1"/>
+          <p:nvPr/>
+        </p:nvSpPr>
+        <p:spPr>
+          <a:xfrm>
+            <a:off x="2743200" y="2678668"/>
+            <a:ext cx="301686" cy="369332"/>
+          </a:xfrm>
+          <a:prstGeom prst="rect">
+            <a:avLst/>
+          </a:prstGeom>
+          <a:noFill/>
+        </p:spPr>
+        <p:txBody>
+          <a:bodyPr wrap="none" rtlCol="0">
+            <a:spAutoFit/>
+          </a:bodyPr>
+          <a:lstStyle/>
+          <a:p>
+            <a:r>
+              <a:rPr lang="en-IN" dirty="0">
+                <a:solidFill>
+                  <a:srgbClr val="FF0000"/>
+                </a:solidFill>
+              </a:rPr>
+              <a:t>3</a:t>
+            </a:r>
+          </a:p>
+        </p:txBody>
+      </p:sp>
+      <p:sp>
+        <p:nvSpPr>
+          <p:cNvPr id="27" name="TextBox 26"/>
+          <p:cNvSpPr txBox="1"/>
+          <p:nvPr/>
+        </p:nvSpPr>
+        <p:spPr>
+          <a:xfrm>
+            <a:off x="1905000" y="3352800"/>
+            <a:ext cx="301686" cy="369332"/>
+          </a:xfrm>
+          <a:prstGeom prst="rect">
+            <a:avLst/>
+          </a:prstGeom>
+          <a:noFill/>
+        </p:spPr>
+        <p:txBody>
+          <a:bodyPr wrap="none" rtlCol="0">
+            <a:spAutoFit/>
+          </a:bodyPr>
+          <a:lstStyle/>
+          <a:p>
+            <a:r>
+              <a:rPr lang="en-IN" dirty="0">
+                <a:solidFill>
+                  <a:srgbClr val="FF0000"/>
+                </a:solidFill>
+              </a:rPr>
+              <a:t>4</a:t>
+            </a:r>
+          </a:p>
+        </p:txBody>
+      </p:sp>
+      <p:sp>
+        <p:nvSpPr>
+          <p:cNvPr id="28" name="TextBox 27"/>
+          <p:cNvSpPr txBox="1"/>
+          <p:nvPr/>
+        </p:nvSpPr>
+        <p:spPr>
+          <a:xfrm>
+            <a:off x="6175314" y="2678668"/>
+            <a:ext cx="301686" cy="369332"/>
+          </a:xfrm>
+          <a:prstGeom prst="rect">
+            <a:avLst/>
+          </a:prstGeom>
+          <a:noFill/>
+        </p:spPr>
+        <p:txBody>
+          <a:bodyPr wrap="none" rtlCol="0">
+            <a:spAutoFit/>
+          </a:bodyPr>
+          <a:lstStyle/>
+          <a:p>
+            <a:r>
+              <a:rPr lang="en-IN" dirty="0">
+                <a:solidFill>
+                  <a:srgbClr val="FF0000"/>
+                </a:solidFill>
+              </a:rPr>
+              <a:t>5</a:t>
+            </a:r>
+          </a:p>
+        </p:txBody>
+      </p:sp>
+      <p:sp>
+        <p:nvSpPr>
+          <p:cNvPr id="29" name="TextBox 28"/>
+          <p:cNvSpPr txBox="1"/>
+          <p:nvPr/>
+        </p:nvSpPr>
+        <p:spPr>
+          <a:xfrm>
+            <a:off x="5794314" y="3669268"/>
+            <a:ext cx="301686" cy="369332"/>
+          </a:xfrm>
+          <a:prstGeom prst="rect">
+            <a:avLst/>
+          </a:prstGeom>
+          <a:noFill/>
+        </p:spPr>
+        <p:txBody>
+          <a:bodyPr wrap="none" rtlCol="0">
+            <a:spAutoFit/>
+          </a:bodyPr>
+          <a:lstStyle/>
+          <a:p>
+            <a:r>
+              <a:rPr lang="en-IN" dirty="0">
+                <a:solidFill>
+                  <a:srgbClr val="FF0000"/>
+                </a:solidFill>
+              </a:rPr>
+              <a:t>6</a:t>
+            </a:r>
+          </a:p>
+        </p:txBody>
+      </p:sp>
+    </p:spTree>
+    <p:extLst>
+      <p:ext uri="{BB962C8B-B14F-4D97-AF65-F5344CB8AC3E}">
+        <p14:creationId xmlns:p14="http://schemas.microsoft.com/office/powerpoint/2010/main" val="2905028034"/>
+      </p:ext>
+    </p:extLst>
+  </p:cSld>
+  <p:clrMapOvr>
+    <a:masterClrMapping/>
+  </p:clrMapOvr>
+</p:sld>
+</file>
+
+<file path=ppt/slides/slide4.xml><?xml version="1.0" encoding="utf-8"?>
+<p:sld xmlns:a="http://schemas.openxmlformats.org/drawingml/2006/main" xmlns:r="http://schemas.openxmlformats.org/officeDocument/2006/relationships" xmlns:p="http://schemas.openxmlformats.org/presentationml/2006/main">
+  <p:cSld>
+    <p:spTree>
+      <p:nvGrpSpPr>
+        <p:cNvPr id="1" name=""/>
+        <p:cNvGrpSpPr/>
+        <p:nvPr/>
+      </p:nvGrpSpPr>
+      <p:grpSpPr>
+        <a:xfrm>
+          <a:off x="0" y="0"/>
+          <a:ext cx="0" cy="0"/>
+          <a:chOff x="0" y="0"/>
+          <a:chExt cx="0" cy="0"/>
+        </a:xfrm>
+      </p:grpSpPr>
+      <p:pic>
+        <p:nvPicPr>
+          <p:cNvPr id="3074" name="Picture 2"/>
+          <p:cNvPicPr>
+            <a:picLocks noChangeAspect="1" noChangeArrowheads="1"/>
+          </p:cNvPicPr>
+          <p:nvPr/>
+        </p:nvPicPr>
+        <p:blipFill>
+          <a:blip r:embed="rId2">
+            <a:extLst>
+              <a:ext uri="{28A0092B-C50C-407E-A947-70E740481C1C}">
+                <a14:useLocalDpi xmlns:a14="http://schemas.microsoft.com/office/drawing/2010/main" val="0"/>
+              </a:ext>
+            </a:extLst>
+          </a:blip>
+          <a:srcRect/>
+          <a:stretch>
+            <a:fillRect/>
+          </a:stretch>
+        </p:blipFill>
+        <p:spPr bwMode="auto">
+          <a:xfrm>
+            <a:off x="307975" y="609600"/>
+            <a:ext cx="8526463" cy="5867400"/>
+          </a:xfrm>
+          <a:prstGeom prst="rect">
+            <a:avLst/>
+          </a:prstGeom>
+          <a:noFill/>
+          <a:ln>
+            <a:noFill/>
+          </a:ln>
+          <a:effectLst/>
+          <a:extLst>
+            <a:ext uri="{909E8E84-426E-40DD-AFC4-6F175D3DCCD1}">
+              <a14:hiddenFill xmlns:a14="http://schemas.microsoft.com/office/drawing/2010/main">
+                <a:solidFill>
+                  <a:schemeClr val="accent1"/>
+                </a:solidFill>
+              </a14:hiddenFill>
+            </a:ext>
+            <a:ext uri="{91240B29-F687-4F45-9708-019B960494DF}">
+              <a14:hiddenLine xmlns:a14="http://schemas.microsoft.com/office/drawing/2010/main" w="9525">
+                <a:solidFill>
+                  <a:schemeClr val="tx1"/>
+                </a:solidFill>
+                <a:miter lim="800000"/>
+                <a:headEnd/>
+                <a:tailEnd/>
+              </a14:hiddenLine>
+            </a:ext>
+            <a:ext uri="{AF507438-7753-43E0-B8FC-AC1667EBCBE1}">
+              <a14:hiddenEffects xmlns:a14="http://schemas.microsoft.com/office/drawing/2010/main">
+                <a:effectLst>
+                  <a:outerShdw dist="35921" dir="2700000" algn="ctr" rotWithShape="0">
+                    <a:schemeClr val="bg2"/>
+                  </a:outerShdw>
+                </a:effectLst>
+              </a14:hiddenEffects>
+            </a:ext>
+          </a:extLst>
+        </p:spPr>
+      </p:pic>
+      <p:cxnSp>
+        <p:nvCxnSpPr>
+          <p:cNvPr id="17" name="Straight Arrow Connector 16"/>
+          <p:cNvCxnSpPr/>
+          <p:nvPr/>
+        </p:nvCxnSpPr>
+        <p:spPr>
+          <a:xfrm>
+            <a:off x="2819400" y="1828800"/>
+            <a:ext cx="1751806" cy="1828800"/>
+          </a:xfrm>
+          <a:prstGeom prst="straightConnector1">
+            <a:avLst/>
+          </a:prstGeom>
+          <a:ln>
+            <a:tailEnd type="arrow"/>
+          </a:ln>
+        </p:spPr>
+        <p:style>
+          <a:lnRef idx="1">
+            <a:schemeClr val="accent1"/>
+          </a:lnRef>
+          <a:fillRef idx="0">
+            <a:schemeClr val="accent1"/>
+          </a:fillRef>
+          <a:effectRef idx="0">
+            <a:schemeClr val="accent1"/>
+          </a:effectRef>
+          <a:fontRef idx="minor">
+            <a:schemeClr val="tx1"/>
+          </a:fontRef>
+        </p:style>
+      </p:cxnSp>
+      <p:cxnSp>
+        <p:nvCxnSpPr>
+          <p:cNvPr id="19" name="Straight Arrow Connector 18"/>
+          <p:cNvCxnSpPr/>
+          <p:nvPr/>
+        </p:nvCxnSpPr>
+        <p:spPr>
+          <a:xfrm flipV="1">
+            <a:off x="4800600" y="2286001"/>
+            <a:ext cx="1752600" cy="1447799"/>
+          </a:xfrm>
+          <a:prstGeom prst="straightConnector1">
+            <a:avLst/>
+          </a:prstGeom>
+          <a:ln>
+            <a:tailEnd type="arrow"/>
+          </a:ln>
+        </p:spPr>
+        <p:style>
+          <a:lnRef idx="1">
+            <a:schemeClr val="accent1"/>
+          </a:lnRef>
+          <a:fillRef idx="0">
+            <a:schemeClr val="accent1"/>
+          </a:fillRef>
+          <a:effectRef idx="0">
+            <a:schemeClr val="accent1"/>
+          </a:effectRef>
+          <a:fontRef idx="minor">
+            <a:schemeClr val="tx1"/>
+          </a:fontRef>
+        </p:style>
+      </p:cxnSp>
+      <p:cxnSp>
+        <p:nvCxnSpPr>
+          <p:cNvPr id="20" name="Straight Arrow Connector 19"/>
+          <p:cNvCxnSpPr/>
+          <p:nvPr/>
+        </p:nvCxnSpPr>
+        <p:spPr>
+          <a:xfrm flipH="1" flipV="1">
+            <a:off x="2438400" y="2514600"/>
+            <a:ext cx="1143000" cy="1219200"/>
+          </a:xfrm>
+          <a:prstGeom prst="straightConnector1">
+            <a:avLst/>
+          </a:prstGeom>
+          <a:ln>
+            <a:tailEnd type="arrow"/>
+          </a:ln>
+        </p:spPr>
+        <p:style>
+          <a:lnRef idx="1">
+            <a:schemeClr val="accent1"/>
+          </a:lnRef>
+          <a:fillRef idx="0">
+            <a:schemeClr val="accent1"/>
+          </a:fillRef>
+          <a:effectRef idx="0">
+            <a:schemeClr val="accent1"/>
+          </a:effectRef>
+          <a:fontRef idx="minor">
+            <a:schemeClr val="tx1"/>
+          </a:fontRef>
+        </p:style>
+      </p:cxnSp>
+      <p:cxnSp>
+        <p:nvCxnSpPr>
+          <p:cNvPr id="22" name="Straight Arrow Connector 21"/>
+          <p:cNvCxnSpPr/>
+          <p:nvPr/>
+        </p:nvCxnSpPr>
+        <p:spPr>
+          <a:xfrm>
+            <a:off x="1295400" y="2590800"/>
+            <a:ext cx="1751806" cy="1447800"/>
+          </a:xfrm>
+          <a:prstGeom prst="straightConnector1">
+            <a:avLst/>
+          </a:prstGeom>
+          <a:ln>
+            <a:tailEnd type="arrow"/>
+          </a:ln>
+        </p:spPr>
+        <p:style>
+          <a:lnRef idx="1">
+            <a:schemeClr val="accent1"/>
+          </a:lnRef>
+          <a:fillRef idx="0">
+            <a:schemeClr val="accent1"/>
+          </a:fillRef>
+          <a:effectRef idx="0">
+            <a:schemeClr val="accent1"/>
+          </a:effectRef>
+          <a:fontRef idx="minor">
+            <a:schemeClr val="tx1"/>
+          </a:fontRef>
+        </p:style>
+      </p:cxnSp>
+      <p:cxnSp>
+        <p:nvCxnSpPr>
+          <p:cNvPr id="24" name="Straight Arrow Connector 23"/>
+          <p:cNvCxnSpPr/>
+          <p:nvPr/>
+        </p:nvCxnSpPr>
+        <p:spPr>
+          <a:xfrm flipV="1">
+            <a:off x="4800600" y="2362200"/>
+            <a:ext cx="2514600" cy="1524000"/>
+          </a:xfrm>
+          <a:prstGeom prst="straightConnector1">
+            <a:avLst/>
+          </a:prstGeom>
+          <a:ln>
+            <a:tailEnd type="arrow"/>
+          </a:ln>
+        </p:spPr>
+        <p:style>
+          <a:lnRef idx="1">
+            <a:schemeClr val="accent1"/>
+          </a:lnRef>
+          <a:fillRef idx="0">
+            <a:schemeClr val="accent1"/>
+          </a:fillRef>
+          <a:effectRef idx="0">
+            <a:schemeClr val="accent1"/>
+          </a:effectRef>
+          <a:fontRef idx="minor">
+            <a:schemeClr val="tx1"/>
+          </a:fontRef>
+        </p:style>
+      </p:cxnSp>
+      <p:cxnSp>
+        <p:nvCxnSpPr>
+          <p:cNvPr id="30" name="Straight Arrow Connector 29"/>
+          <p:cNvCxnSpPr/>
+          <p:nvPr/>
+        </p:nvCxnSpPr>
+        <p:spPr>
+          <a:xfrm flipH="1">
+            <a:off x="4114800" y="2286001"/>
+            <a:ext cx="3848497" cy="3200399"/>
+          </a:xfrm>
+          <a:prstGeom prst="straightConnector1">
+            <a:avLst/>
+          </a:prstGeom>
+          <a:ln>
+            <a:tailEnd type="arrow"/>
+          </a:ln>
+        </p:spPr>
+        <p:style>
+          <a:lnRef idx="1">
+            <a:schemeClr val="accent1"/>
+          </a:lnRef>
+          <a:fillRef idx="0">
+            <a:schemeClr val="accent1"/>
+          </a:fillRef>
+          <a:effectRef idx="0">
+            <a:schemeClr val="accent1"/>
+          </a:effectRef>
+          <a:fontRef idx="minor">
+            <a:schemeClr val="tx1"/>
+          </a:fontRef>
+        </p:style>
+      </p:cxnSp>
+      <p:sp>
+        <p:nvSpPr>
+          <p:cNvPr id="31" name="TextBox 30"/>
+          <p:cNvSpPr txBox="1"/>
+          <p:nvPr/>
+        </p:nvSpPr>
+        <p:spPr>
+          <a:xfrm>
+            <a:off x="3505200" y="2373868"/>
+            <a:ext cx="301686" cy="369332"/>
+          </a:xfrm>
+          <a:prstGeom prst="rect">
+            <a:avLst/>
+          </a:prstGeom>
+          <a:noFill/>
+        </p:spPr>
+        <p:txBody>
+          <a:bodyPr wrap="none" rtlCol="0">
+            <a:spAutoFit/>
+          </a:bodyPr>
+          <a:lstStyle/>
+          <a:p>
+            <a:r>
+              <a:rPr lang="en-IN" dirty="0">
+                <a:solidFill>
+                  <a:srgbClr val="FF0000"/>
+                </a:solidFill>
+              </a:rPr>
+              <a:t>1</a:t>
+            </a:r>
+          </a:p>
+        </p:txBody>
+      </p:sp>
+      <p:sp>
+        <p:nvSpPr>
+          <p:cNvPr id="32" name="TextBox 31"/>
+          <p:cNvSpPr txBox="1"/>
+          <p:nvPr/>
+        </p:nvSpPr>
+        <p:spPr>
+          <a:xfrm>
+            <a:off x="5641914" y="2526268"/>
+            <a:ext cx="301686" cy="369332"/>
+          </a:xfrm>
+          <a:prstGeom prst="rect">
+            <a:avLst/>
+          </a:prstGeom>
+          <a:noFill/>
+        </p:spPr>
+        <p:txBody>
+          <a:bodyPr wrap="none" rtlCol="0">
+            <a:spAutoFit/>
+          </a:bodyPr>
+          <a:lstStyle/>
+          <a:p>
+            <a:r>
+              <a:rPr lang="en-IN" dirty="0" smtClean="0">
+                <a:solidFill>
+                  <a:srgbClr val="FF0000"/>
+                </a:solidFill>
+              </a:rPr>
+              <a:t>2</a:t>
+            </a:r>
+            <a:endParaRPr lang="en-IN" dirty="0">
+              <a:solidFill>
+                <a:srgbClr val="FF0000"/>
+              </a:solidFill>
+            </a:endParaRPr>
+          </a:p>
+        </p:txBody>
+      </p:sp>
+      <p:sp>
+        <p:nvSpPr>
+          <p:cNvPr id="33" name="TextBox 32"/>
+          <p:cNvSpPr txBox="1"/>
+          <p:nvPr/>
+        </p:nvSpPr>
+        <p:spPr>
+          <a:xfrm>
+            <a:off x="2743200" y="2678668"/>
+            <a:ext cx="301686" cy="369332"/>
+          </a:xfrm>
+          <a:prstGeom prst="rect">
+            <a:avLst/>
+          </a:prstGeom>
+          <a:noFill/>
+        </p:spPr>
+        <p:txBody>
+          <a:bodyPr wrap="none" rtlCol="0">
+            <a:spAutoFit/>
+          </a:bodyPr>
+          <a:lstStyle/>
+          <a:p>
+            <a:r>
+              <a:rPr lang="en-IN" dirty="0">
+                <a:solidFill>
+                  <a:srgbClr val="FF0000"/>
+                </a:solidFill>
+              </a:rPr>
+              <a:t>3</a:t>
+            </a:r>
+          </a:p>
+        </p:txBody>
+      </p:sp>
+      <p:sp>
+        <p:nvSpPr>
+          <p:cNvPr id="34" name="TextBox 33"/>
+          <p:cNvSpPr txBox="1"/>
+          <p:nvPr/>
+        </p:nvSpPr>
+        <p:spPr>
+          <a:xfrm>
+            <a:off x="1905000" y="3352800"/>
+            <a:ext cx="301686" cy="369332"/>
+          </a:xfrm>
+          <a:prstGeom prst="rect">
+            <a:avLst/>
+          </a:prstGeom>
+          <a:noFill/>
+        </p:spPr>
+        <p:txBody>
+          <a:bodyPr wrap="none" rtlCol="0">
+            <a:spAutoFit/>
+          </a:bodyPr>
+          <a:lstStyle/>
+          <a:p>
+            <a:r>
+              <a:rPr lang="en-IN" dirty="0">
+                <a:solidFill>
+                  <a:srgbClr val="FF0000"/>
+                </a:solidFill>
+              </a:rPr>
+              <a:t>4</a:t>
+            </a:r>
+          </a:p>
+        </p:txBody>
+      </p:sp>
+      <p:sp>
+        <p:nvSpPr>
+          <p:cNvPr id="35" name="TextBox 34"/>
+          <p:cNvSpPr txBox="1"/>
+          <p:nvPr/>
+        </p:nvSpPr>
+        <p:spPr>
+          <a:xfrm>
+            <a:off x="6175314" y="2678668"/>
+            <a:ext cx="301686" cy="369332"/>
+          </a:xfrm>
+          <a:prstGeom prst="rect">
+            <a:avLst/>
+          </a:prstGeom>
+          <a:noFill/>
+        </p:spPr>
+        <p:txBody>
+          <a:bodyPr wrap="none" rtlCol="0">
+            <a:spAutoFit/>
+          </a:bodyPr>
+          <a:lstStyle/>
+          <a:p>
+            <a:r>
+              <a:rPr lang="en-IN" dirty="0">
+                <a:solidFill>
+                  <a:srgbClr val="FF0000"/>
+                </a:solidFill>
+              </a:rPr>
+              <a:t>5</a:t>
+            </a:r>
+          </a:p>
+        </p:txBody>
+      </p:sp>
+      <p:sp>
+        <p:nvSpPr>
+          <p:cNvPr id="36" name="TextBox 35"/>
+          <p:cNvSpPr txBox="1"/>
+          <p:nvPr/>
+        </p:nvSpPr>
+        <p:spPr>
+          <a:xfrm>
+            <a:off x="5794314" y="3669268"/>
+            <a:ext cx="301686" cy="369332"/>
+          </a:xfrm>
+          <a:prstGeom prst="rect">
+            <a:avLst/>
+          </a:prstGeom>
+          <a:noFill/>
+        </p:spPr>
+        <p:txBody>
+          <a:bodyPr wrap="none" rtlCol="0">
+            <a:spAutoFit/>
+          </a:bodyPr>
+          <a:lstStyle/>
+          <a:p>
+            <a:r>
+              <a:rPr lang="en-IN" dirty="0">
+                <a:solidFill>
+                  <a:srgbClr val="FF0000"/>
+                </a:solidFill>
+              </a:rPr>
+              <a:t>6</a:t>
+            </a:r>
+          </a:p>
+        </p:txBody>
+      </p:sp>
+    </p:spTree>
+    <p:extLst>
+      <p:ext uri="{BB962C8B-B14F-4D97-AF65-F5344CB8AC3E}">
+        <p14:creationId xmlns:p14="http://schemas.microsoft.com/office/powerpoint/2010/main" val="596675423"/>
+      </p:ext>
+    </p:extLst>
+  </p:cSld>
+  <p:clrMapOvr>
+    <a:masterClrMapping/>
+  </p:clrMapOvr>
+</p:sld>
+</file>
+
 <file path=ppt/theme/theme1.xml><?xml version="1.0" encoding="utf-8"?>
 <a:theme xmlns:a="http://schemas.openxmlformats.org/drawingml/2006/main" name="Office Theme">
   <a:themeElements>

</xml_diff>